<commit_message>
Submited changes from upstream to Mini.
</commit_message>
<xml_diff>
--- a/S1 - Bienvenida, estructuras de datos y de control/S1.TU3/Archivos/Presentacion Estructuras de Control.pptx
+++ b/S1 - Bienvenida, estructuras de datos y de control/S1.TU3/Archivos/Presentacion Estructuras de Control.pptx
@@ -8,6 +8,7 @@
     <p:sldId id="256" r:id="rId2"/>
     <p:sldId id="258" r:id="rId3"/>
     <p:sldId id="257" r:id="rId4"/>
+    <p:sldId id="260" r:id="rId5"/>
   </p:sldIdLst>
   <p:sldSz cx="12192000" cy="6858000"/>
   <p:notesSz cx="6858000" cy="9144000"/>
@@ -106,6 +107,11 @@
       </a:defRPr>
     </a:lvl9pPr>
   </p:defaultTextStyle>
+  <p:extLst>
+    <p:ext uri="{EFAFB233-063F-42B5-8137-9DF3F51BA10A}">
+      <p15:sldGuideLst xmlns:p15="http://schemas.microsoft.com/office/powerpoint/2012/main"/>
+    </p:ext>
+  </p:extLst>
 </p:presentation>
 </file>
 
@@ -151,7 +157,7 @@
           </a:lstStyle>
           <a:p>
             <a:r>
-              <a:rPr lang="es-ES" smtClean="0"/>
+              <a:rPr lang="es-ES"/>
               <a:t>Haga clic para modificar el estilo de título del patrón</a:t>
             </a:r>
             <a:endParaRPr lang="en-US"/>
@@ -216,7 +222,7 @@
           </a:lstStyle>
           <a:p>
             <a:r>
-              <a:rPr lang="es-ES" smtClean="0"/>
+              <a:rPr lang="es-ES"/>
               <a:t>Haga clic para editar el estilo de subtítulo del patrón</a:t>
             </a:r>
             <a:endParaRPr lang="en-US"/>
@@ -240,7 +246,7 @@
           <a:p>
             <a:fld id="{08BCA661-B66E-4010-8A0E-0E7EB18F71BF}" type="datetimeFigureOut">
               <a:rPr lang="en-US" smtClean="0"/>
-              <a:t>9/3/2020</a:t>
+              <a:t>8/6/2023</a:t>
             </a:fld>
             <a:endParaRPr lang="en-US"/>
           </a:p>
@@ -334,7 +340,7 @@
           <a:lstStyle/>
           <a:p>
             <a:r>
-              <a:rPr lang="es-ES" smtClean="0"/>
+              <a:rPr lang="es-ES"/>
               <a:t>Haga clic para modificar el estilo de título del patrón</a:t>
             </a:r>
             <a:endParaRPr lang="en-US"/>
@@ -358,35 +364,35 @@
           <a:p>
             <a:pPr lvl="0"/>
             <a:r>
-              <a:rPr lang="es-ES" smtClean="0"/>
+              <a:rPr lang="es-ES"/>
               <a:t>Editar el estilo de texto del patrón</a:t>
             </a:r>
           </a:p>
           <a:p>
             <a:pPr lvl="1"/>
             <a:r>
-              <a:rPr lang="es-ES" smtClean="0"/>
+              <a:rPr lang="es-ES"/>
               <a:t>Segundo nivel</a:t>
             </a:r>
           </a:p>
           <a:p>
             <a:pPr lvl="2"/>
             <a:r>
-              <a:rPr lang="es-ES" smtClean="0"/>
+              <a:rPr lang="es-ES"/>
               <a:t>Tercer nivel</a:t>
             </a:r>
           </a:p>
           <a:p>
             <a:pPr lvl="3"/>
             <a:r>
-              <a:rPr lang="es-ES" smtClean="0"/>
+              <a:rPr lang="es-ES"/>
               <a:t>Cuarto nivel</a:t>
             </a:r>
           </a:p>
           <a:p>
             <a:pPr lvl="4"/>
             <a:r>
-              <a:rPr lang="es-ES" smtClean="0"/>
+              <a:rPr lang="es-ES"/>
               <a:t>Quinto nivel</a:t>
             </a:r>
             <a:endParaRPr lang="en-US"/>
@@ -410,7 +416,7 @@
           <a:p>
             <a:fld id="{08BCA661-B66E-4010-8A0E-0E7EB18F71BF}" type="datetimeFigureOut">
               <a:rPr lang="en-US" smtClean="0"/>
-              <a:t>9/3/2020</a:t>
+              <a:t>8/6/2023</a:t>
             </a:fld>
             <a:endParaRPr lang="en-US"/>
           </a:p>
@@ -509,7 +515,7 @@
           <a:lstStyle/>
           <a:p>
             <a:r>
-              <a:rPr lang="es-ES" smtClean="0"/>
+              <a:rPr lang="es-ES"/>
               <a:t>Haga clic para modificar el estilo de título del patrón</a:t>
             </a:r>
             <a:endParaRPr lang="en-US"/>
@@ -538,35 +544,35 @@
           <a:p>
             <a:pPr lvl="0"/>
             <a:r>
-              <a:rPr lang="es-ES" smtClean="0"/>
+              <a:rPr lang="es-ES"/>
               <a:t>Editar el estilo de texto del patrón</a:t>
             </a:r>
           </a:p>
           <a:p>
             <a:pPr lvl="1"/>
             <a:r>
-              <a:rPr lang="es-ES" smtClean="0"/>
+              <a:rPr lang="es-ES"/>
               <a:t>Segundo nivel</a:t>
             </a:r>
           </a:p>
           <a:p>
             <a:pPr lvl="2"/>
             <a:r>
-              <a:rPr lang="es-ES" smtClean="0"/>
+              <a:rPr lang="es-ES"/>
               <a:t>Tercer nivel</a:t>
             </a:r>
           </a:p>
           <a:p>
             <a:pPr lvl="3"/>
             <a:r>
-              <a:rPr lang="es-ES" smtClean="0"/>
+              <a:rPr lang="es-ES"/>
               <a:t>Cuarto nivel</a:t>
             </a:r>
           </a:p>
           <a:p>
             <a:pPr lvl="4"/>
             <a:r>
-              <a:rPr lang="es-ES" smtClean="0"/>
+              <a:rPr lang="es-ES"/>
               <a:t>Quinto nivel</a:t>
             </a:r>
             <a:endParaRPr lang="en-US"/>
@@ -590,7 +596,7 @@
           <a:p>
             <a:fld id="{08BCA661-B66E-4010-8A0E-0E7EB18F71BF}" type="datetimeFigureOut">
               <a:rPr lang="en-US" smtClean="0"/>
-              <a:t>9/3/2020</a:t>
+              <a:t>8/6/2023</a:t>
             </a:fld>
             <a:endParaRPr lang="en-US"/>
           </a:p>
@@ -684,7 +690,7 @@
           <a:lstStyle/>
           <a:p>
             <a:r>
-              <a:rPr lang="es-ES" smtClean="0"/>
+              <a:rPr lang="es-ES"/>
               <a:t>Haga clic para modificar el estilo de título del patrón</a:t>
             </a:r>
             <a:endParaRPr lang="en-US"/>
@@ -708,35 +714,35 @@
           <a:p>
             <a:pPr lvl="0"/>
             <a:r>
-              <a:rPr lang="es-ES" smtClean="0"/>
+              <a:rPr lang="es-ES"/>
               <a:t>Editar el estilo de texto del patrón</a:t>
             </a:r>
           </a:p>
           <a:p>
             <a:pPr lvl="1"/>
             <a:r>
-              <a:rPr lang="es-ES" smtClean="0"/>
+              <a:rPr lang="es-ES"/>
               <a:t>Segundo nivel</a:t>
             </a:r>
           </a:p>
           <a:p>
             <a:pPr lvl="2"/>
             <a:r>
-              <a:rPr lang="es-ES" smtClean="0"/>
+              <a:rPr lang="es-ES"/>
               <a:t>Tercer nivel</a:t>
             </a:r>
           </a:p>
           <a:p>
             <a:pPr lvl="3"/>
             <a:r>
-              <a:rPr lang="es-ES" smtClean="0"/>
+              <a:rPr lang="es-ES"/>
               <a:t>Cuarto nivel</a:t>
             </a:r>
           </a:p>
           <a:p>
             <a:pPr lvl="4"/>
             <a:r>
-              <a:rPr lang="es-ES" smtClean="0"/>
+              <a:rPr lang="es-ES"/>
               <a:t>Quinto nivel</a:t>
             </a:r>
             <a:endParaRPr lang="en-US"/>
@@ -760,7 +766,7 @@
           <a:p>
             <a:fld id="{08BCA661-B66E-4010-8A0E-0E7EB18F71BF}" type="datetimeFigureOut">
               <a:rPr lang="en-US" smtClean="0"/>
-              <a:t>9/3/2020</a:t>
+              <a:t>8/6/2023</a:t>
             </a:fld>
             <a:endParaRPr lang="en-US"/>
           </a:p>
@@ -863,7 +869,7 @@
           </a:lstStyle>
           <a:p>
             <a:r>
-              <a:rPr lang="es-ES" smtClean="0"/>
+              <a:rPr lang="es-ES"/>
               <a:t>Haga clic para modificar el estilo de título del patrón</a:t>
             </a:r>
             <a:endParaRPr lang="en-US"/>
@@ -983,7 +989,7 @@
           <a:p>
             <a:pPr lvl="0"/>
             <a:r>
-              <a:rPr lang="es-ES" smtClean="0"/>
+              <a:rPr lang="es-ES"/>
               <a:t>Editar el estilo de texto del patrón</a:t>
             </a:r>
           </a:p>
@@ -1006,7 +1012,7 @@
           <a:p>
             <a:fld id="{08BCA661-B66E-4010-8A0E-0E7EB18F71BF}" type="datetimeFigureOut">
               <a:rPr lang="en-US" smtClean="0"/>
-              <a:t>9/3/2020</a:t>
+              <a:t>8/6/2023</a:t>
             </a:fld>
             <a:endParaRPr lang="en-US"/>
           </a:p>
@@ -1100,7 +1106,7 @@
           <a:lstStyle/>
           <a:p>
             <a:r>
-              <a:rPr lang="es-ES" smtClean="0"/>
+              <a:rPr lang="es-ES"/>
               <a:t>Haga clic para modificar el estilo de título del patrón</a:t>
             </a:r>
             <a:endParaRPr lang="en-US"/>
@@ -1129,35 +1135,35 @@
           <a:p>
             <a:pPr lvl="0"/>
             <a:r>
-              <a:rPr lang="es-ES" smtClean="0"/>
+              <a:rPr lang="es-ES"/>
               <a:t>Editar el estilo de texto del patrón</a:t>
             </a:r>
           </a:p>
           <a:p>
             <a:pPr lvl="1"/>
             <a:r>
-              <a:rPr lang="es-ES" smtClean="0"/>
+              <a:rPr lang="es-ES"/>
               <a:t>Segundo nivel</a:t>
             </a:r>
           </a:p>
           <a:p>
             <a:pPr lvl="2"/>
             <a:r>
-              <a:rPr lang="es-ES" smtClean="0"/>
+              <a:rPr lang="es-ES"/>
               <a:t>Tercer nivel</a:t>
             </a:r>
           </a:p>
           <a:p>
             <a:pPr lvl="3"/>
             <a:r>
-              <a:rPr lang="es-ES" smtClean="0"/>
+              <a:rPr lang="es-ES"/>
               <a:t>Cuarto nivel</a:t>
             </a:r>
           </a:p>
           <a:p>
             <a:pPr lvl="4"/>
             <a:r>
-              <a:rPr lang="es-ES" smtClean="0"/>
+              <a:rPr lang="es-ES"/>
               <a:t>Quinto nivel</a:t>
             </a:r>
             <a:endParaRPr lang="en-US"/>
@@ -1186,35 +1192,35 @@
           <a:p>
             <a:pPr lvl="0"/>
             <a:r>
-              <a:rPr lang="es-ES" smtClean="0"/>
+              <a:rPr lang="es-ES"/>
               <a:t>Editar el estilo de texto del patrón</a:t>
             </a:r>
           </a:p>
           <a:p>
             <a:pPr lvl="1"/>
             <a:r>
-              <a:rPr lang="es-ES" smtClean="0"/>
+              <a:rPr lang="es-ES"/>
               <a:t>Segundo nivel</a:t>
             </a:r>
           </a:p>
           <a:p>
             <a:pPr lvl="2"/>
             <a:r>
-              <a:rPr lang="es-ES" smtClean="0"/>
+              <a:rPr lang="es-ES"/>
               <a:t>Tercer nivel</a:t>
             </a:r>
           </a:p>
           <a:p>
             <a:pPr lvl="3"/>
             <a:r>
-              <a:rPr lang="es-ES" smtClean="0"/>
+              <a:rPr lang="es-ES"/>
               <a:t>Cuarto nivel</a:t>
             </a:r>
           </a:p>
           <a:p>
             <a:pPr lvl="4"/>
             <a:r>
-              <a:rPr lang="es-ES" smtClean="0"/>
+              <a:rPr lang="es-ES"/>
               <a:t>Quinto nivel</a:t>
             </a:r>
             <a:endParaRPr lang="en-US"/>
@@ -1238,7 +1244,7 @@
           <a:p>
             <a:fld id="{08BCA661-B66E-4010-8A0E-0E7EB18F71BF}" type="datetimeFigureOut">
               <a:rPr lang="en-US" smtClean="0"/>
-              <a:t>9/3/2020</a:t>
+              <a:t>8/6/2023</a:t>
             </a:fld>
             <a:endParaRPr lang="en-US"/>
           </a:p>
@@ -1337,7 +1343,7 @@
           <a:lstStyle/>
           <a:p>
             <a:r>
-              <a:rPr lang="es-ES" smtClean="0"/>
+              <a:rPr lang="es-ES"/>
               <a:t>Haga clic para modificar el estilo de título del patrón</a:t>
             </a:r>
             <a:endParaRPr lang="en-US"/>
@@ -1403,7 +1409,7 @@
           <a:p>
             <a:pPr lvl="0"/>
             <a:r>
-              <a:rPr lang="es-ES" smtClean="0"/>
+              <a:rPr lang="es-ES"/>
               <a:t>Editar el estilo de texto del patrón</a:t>
             </a:r>
           </a:p>
@@ -1431,35 +1437,35 @@
           <a:p>
             <a:pPr lvl="0"/>
             <a:r>
-              <a:rPr lang="es-ES" smtClean="0"/>
+              <a:rPr lang="es-ES"/>
               <a:t>Editar el estilo de texto del patrón</a:t>
             </a:r>
           </a:p>
           <a:p>
             <a:pPr lvl="1"/>
             <a:r>
-              <a:rPr lang="es-ES" smtClean="0"/>
+              <a:rPr lang="es-ES"/>
               <a:t>Segundo nivel</a:t>
             </a:r>
           </a:p>
           <a:p>
             <a:pPr lvl="2"/>
             <a:r>
-              <a:rPr lang="es-ES" smtClean="0"/>
+              <a:rPr lang="es-ES"/>
               <a:t>Tercer nivel</a:t>
             </a:r>
           </a:p>
           <a:p>
             <a:pPr lvl="3"/>
             <a:r>
-              <a:rPr lang="es-ES" smtClean="0"/>
+              <a:rPr lang="es-ES"/>
               <a:t>Cuarto nivel</a:t>
             </a:r>
           </a:p>
           <a:p>
             <a:pPr lvl="4"/>
             <a:r>
-              <a:rPr lang="es-ES" smtClean="0"/>
+              <a:rPr lang="es-ES"/>
               <a:t>Quinto nivel</a:t>
             </a:r>
             <a:endParaRPr lang="en-US"/>
@@ -1525,7 +1531,7 @@
           <a:p>
             <a:pPr lvl="0"/>
             <a:r>
-              <a:rPr lang="es-ES" smtClean="0"/>
+              <a:rPr lang="es-ES"/>
               <a:t>Editar el estilo de texto del patrón</a:t>
             </a:r>
           </a:p>
@@ -1553,35 +1559,35 @@
           <a:p>
             <a:pPr lvl="0"/>
             <a:r>
-              <a:rPr lang="es-ES" smtClean="0"/>
+              <a:rPr lang="es-ES"/>
               <a:t>Editar el estilo de texto del patrón</a:t>
             </a:r>
           </a:p>
           <a:p>
             <a:pPr lvl="1"/>
             <a:r>
-              <a:rPr lang="es-ES" smtClean="0"/>
+              <a:rPr lang="es-ES"/>
               <a:t>Segundo nivel</a:t>
             </a:r>
           </a:p>
           <a:p>
             <a:pPr lvl="2"/>
             <a:r>
-              <a:rPr lang="es-ES" smtClean="0"/>
+              <a:rPr lang="es-ES"/>
               <a:t>Tercer nivel</a:t>
             </a:r>
           </a:p>
           <a:p>
             <a:pPr lvl="3"/>
             <a:r>
-              <a:rPr lang="es-ES" smtClean="0"/>
+              <a:rPr lang="es-ES"/>
               <a:t>Cuarto nivel</a:t>
             </a:r>
           </a:p>
           <a:p>
             <a:pPr lvl="4"/>
             <a:r>
-              <a:rPr lang="es-ES" smtClean="0"/>
+              <a:rPr lang="es-ES"/>
               <a:t>Quinto nivel</a:t>
             </a:r>
             <a:endParaRPr lang="en-US"/>
@@ -1605,7 +1611,7 @@
           <a:p>
             <a:fld id="{08BCA661-B66E-4010-8A0E-0E7EB18F71BF}" type="datetimeFigureOut">
               <a:rPr lang="en-US" smtClean="0"/>
-              <a:t>9/3/2020</a:t>
+              <a:t>8/6/2023</a:t>
             </a:fld>
             <a:endParaRPr lang="en-US"/>
           </a:p>
@@ -1699,7 +1705,7 @@
           <a:lstStyle/>
           <a:p>
             <a:r>
-              <a:rPr lang="es-ES" smtClean="0"/>
+              <a:rPr lang="es-ES"/>
               <a:t>Haga clic para modificar el estilo de título del patrón</a:t>
             </a:r>
             <a:endParaRPr lang="en-US"/>
@@ -1723,7 +1729,7 @@
           <a:p>
             <a:fld id="{08BCA661-B66E-4010-8A0E-0E7EB18F71BF}" type="datetimeFigureOut">
               <a:rPr lang="en-US" smtClean="0"/>
-              <a:t>9/3/2020</a:t>
+              <a:t>8/6/2023</a:t>
             </a:fld>
             <a:endParaRPr lang="en-US"/>
           </a:p>
@@ -1818,7 +1824,7 @@
           <a:p>
             <a:fld id="{08BCA661-B66E-4010-8A0E-0E7EB18F71BF}" type="datetimeFigureOut">
               <a:rPr lang="en-US" smtClean="0"/>
-              <a:t>9/3/2020</a:t>
+              <a:t>8/6/2023</a:t>
             </a:fld>
             <a:endParaRPr lang="en-US"/>
           </a:p>
@@ -1921,7 +1927,7 @@
           </a:lstStyle>
           <a:p>
             <a:r>
-              <a:rPr lang="es-ES" smtClean="0"/>
+              <a:rPr lang="es-ES"/>
               <a:t>Haga clic para modificar el estilo de título del patrón</a:t>
             </a:r>
             <a:endParaRPr lang="en-US"/>
@@ -1978,35 +1984,35 @@
           <a:p>
             <a:pPr lvl="0"/>
             <a:r>
-              <a:rPr lang="es-ES" smtClean="0"/>
+              <a:rPr lang="es-ES"/>
               <a:t>Editar el estilo de texto del patrón</a:t>
             </a:r>
           </a:p>
           <a:p>
             <a:pPr lvl="1"/>
             <a:r>
-              <a:rPr lang="es-ES" smtClean="0"/>
+              <a:rPr lang="es-ES"/>
               <a:t>Segundo nivel</a:t>
             </a:r>
           </a:p>
           <a:p>
             <a:pPr lvl="2"/>
             <a:r>
-              <a:rPr lang="es-ES" smtClean="0"/>
+              <a:rPr lang="es-ES"/>
               <a:t>Tercer nivel</a:t>
             </a:r>
           </a:p>
           <a:p>
             <a:pPr lvl="3"/>
             <a:r>
-              <a:rPr lang="es-ES" smtClean="0"/>
+              <a:rPr lang="es-ES"/>
               <a:t>Cuarto nivel</a:t>
             </a:r>
           </a:p>
           <a:p>
             <a:pPr lvl="4"/>
             <a:r>
-              <a:rPr lang="es-ES" smtClean="0"/>
+              <a:rPr lang="es-ES"/>
               <a:t>Quinto nivel</a:t>
             </a:r>
             <a:endParaRPr lang="en-US"/>
@@ -2072,7 +2078,7 @@
           <a:p>
             <a:pPr lvl="0"/>
             <a:r>
-              <a:rPr lang="es-ES" smtClean="0"/>
+              <a:rPr lang="es-ES"/>
               <a:t>Editar el estilo de texto del patrón</a:t>
             </a:r>
           </a:p>
@@ -2095,7 +2101,7 @@
           <a:p>
             <a:fld id="{08BCA661-B66E-4010-8A0E-0E7EB18F71BF}" type="datetimeFigureOut">
               <a:rPr lang="en-US" smtClean="0"/>
-              <a:t>9/3/2020</a:t>
+              <a:t>8/6/2023</a:t>
             </a:fld>
             <a:endParaRPr lang="en-US"/>
           </a:p>
@@ -2198,7 +2204,7 @@
           </a:lstStyle>
           <a:p>
             <a:r>
-              <a:rPr lang="es-ES" smtClean="0"/>
+              <a:rPr lang="es-ES"/>
               <a:t>Haga clic para modificar el estilo de título del patrón</a:t>
             </a:r>
             <a:endParaRPr lang="en-US"/>
@@ -2325,7 +2331,7 @@
           <a:p>
             <a:pPr lvl="0"/>
             <a:r>
-              <a:rPr lang="es-ES" smtClean="0"/>
+              <a:rPr lang="es-ES"/>
               <a:t>Editar el estilo de texto del patrón</a:t>
             </a:r>
           </a:p>
@@ -2348,7 +2354,7 @@
           <a:p>
             <a:fld id="{08BCA661-B66E-4010-8A0E-0E7EB18F71BF}" type="datetimeFigureOut">
               <a:rPr lang="en-US" smtClean="0"/>
-              <a:t>9/3/2020</a:t>
+              <a:t>8/6/2023</a:t>
             </a:fld>
             <a:endParaRPr lang="en-US"/>
           </a:p>
@@ -2457,7 +2463,7 @@
           <a:lstStyle/>
           <a:p>
             <a:r>
-              <a:rPr lang="es-ES" smtClean="0"/>
+              <a:rPr lang="es-ES"/>
               <a:t>Haga clic para modificar el estilo de título del patrón</a:t>
             </a:r>
             <a:endParaRPr lang="en-US"/>
@@ -2491,35 +2497,35 @@
           <a:p>
             <a:pPr lvl="0"/>
             <a:r>
-              <a:rPr lang="es-ES" smtClean="0"/>
+              <a:rPr lang="es-ES"/>
               <a:t>Editar el estilo de texto del patrón</a:t>
             </a:r>
           </a:p>
           <a:p>
             <a:pPr lvl="1"/>
             <a:r>
-              <a:rPr lang="es-ES" smtClean="0"/>
+              <a:rPr lang="es-ES"/>
               <a:t>Segundo nivel</a:t>
             </a:r>
           </a:p>
           <a:p>
             <a:pPr lvl="2"/>
             <a:r>
-              <a:rPr lang="es-ES" smtClean="0"/>
+              <a:rPr lang="es-ES"/>
               <a:t>Tercer nivel</a:t>
             </a:r>
           </a:p>
           <a:p>
             <a:pPr lvl="3"/>
             <a:r>
-              <a:rPr lang="es-ES" smtClean="0"/>
+              <a:rPr lang="es-ES"/>
               <a:t>Cuarto nivel</a:t>
             </a:r>
           </a:p>
           <a:p>
             <a:pPr lvl="4"/>
             <a:r>
-              <a:rPr lang="es-ES" smtClean="0"/>
+              <a:rPr lang="es-ES"/>
               <a:t>Quinto nivel</a:t>
             </a:r>
             <a:endParaRPr lang="en-US"/>
@@ -2561,7 +2567,7 @@
           <a:p>
             <a:fld id="{08BCA661-B66E-4010-8A0E-0E7EB18F71BF}" type="datetimeFigureOut">
               <a:rPr lang="en-US" smtClean="0"/>
-              <a:t>9/3/2020</a:t>
+              <a:t>8/6/2023</a:t>
             </a:fld>
             <a:endParaRPr lang="en-US"/>
           </a:p>
@@ -3009,7 +3015,7 @@
           <a:p>
             <a:pPr algn="ctr"/>
             <a:r>
-              <a:rPr lang="es-CO" b="1" dirty="0" smtClean="0">
+              <a:rPr lang="es-CO" b="1" dirty="0">
                 <a:solidFill>
                   <a:schemeClr val="tx1"/>
                 </a:solidFill>
@@ -3067,7 +3073,7 @@
           <a:p>
             <a:pPr algn="ctr"/>
             <a:r>
-              <a:rPr lang="es-CO" b="1" dirty="0" smtClean="0">
+              <a:rPr lang="es-CO" b="1" dirty="0">
                 <a:solidFill>
                   <a:schemeClr val="tx1"/>
                 </a:solidFill>
@@ -3120,7 +3126,7 @@
           <a:p>
             <a:pPr algn="ctr"/>
             <a:r>
-              <a:rPr lang="es-CO" sz="1300" dirty="0" smtClean="0">
+              <a:rPr lang="es-CO" sz="1300" dirty="0">
                 <a:ln w="0"/>
                 <a:solidFill>
                   <a:schemeClr val="tx1"/>
@@ -3230,7 +3236,7 @@
           <a:p>
             <a:pPr algn="ctr"/>
             <a:r>
-              <a:rPr lang="es-CO" dirty="0" smtClean="0">
+              <a:rPr lang="es-CO" dirty="0">
                 <a:ln w="0"/>
                 <a:solidFill>
                   <a:schemeClr val="tx1"/>
@@ -3394,7 +3400,7 @@
           <a:lstStyle/>
           <a:p>
             <a:r>
-              <a:rPr lang="es-CO" dirty="0" smtClean="0"/>
+              <a:rPr lang="es-CO" dirty="0"/>
               <a:t>True</a:t>
             </a:r>
             <a:endParaRPr lang="en-US" dirty="0"/>
@@ -3424,7 +3430,7 @@
           <a:lstStyle/>
           <a:p>
             <a:r>
-              <a:rPr lang="es-CO" dirty="0" smtClean="0"/>
+              <a:rPr lang="es-CO" dirty="0"/>
               <a:t>False</a:t>
             </a:r>
             <a:endParaRPr lang="en-US" dirty="0"/>
@@ -3504,7 +3510,7 @@
           <a:p>
             <a:pPr algn="ctr"/>
             <a:r>
-              <a:rPr lang="es-CO" b="1" dirty="0" smtClean="0">
+              <a:rPr lang="es-CO" b="1" dirty="0">
                 <a:solidFill>
                   <a:schemeClr val="tx1"/>
                 </a:solidFill>
@@ -3562,7 +3568,7 @@
           <a:p>
             <a:pPr algn="ctr"/>
             <a:r>
-              <a:rPr lang="es-CO" b="1" dirty="0" smtClean="0">
+              <a:rPr lang="es-CO" b="1" dirty="0">
                 <a:solidFill>
                   <a:schemeClr val="tx1"/>
                 </a:solidFill>
@@ -3615,7 +3621,7 @@
           <a:p>
             <a:pPr algn="ctr"/>
             <a:r>
-              <a:rPr lang="es-CO" sz="1300" dirty="0" smtClean="0">
+              <a:rPr lang="es-CO" sz="1300" dirty="0">
                 <a:ln w="0"/>
                 <a:solidFill>
                   <a:schemeClr val="tx1"/>
@@ -3725,7 +3731,7 @@
           <a:p>
             <a:pPr algn="ctr"/>
             <a:r>
-              <a:rPr lang="es-CO" dirty="0" smtClean="0">
+              <a:rPr lang="es-CO" dirty="0">
                 <a:ln w="0"/>
                 <a:solidFill>
                   <a:schemeClr val="tx1"/>
@@ -3851,7 +3857,7 @@
           <a:lstStyle/>
           <a:p>
             <a:r>
-              <a:rPr lang="es-CO" dirty="0" smtClean="0"/>
+              <a:rPr lang="es-CO" dirty="0"/>
               <a:t>True</a:t>
             </a:r>
             <a:endParaRPr lang="en-US" dirty="0"/>
@@ -3881,7 +3887,7 @@
           <a:lstStyle/>
           <a:p>
             <a:r>
-              <a:rPr lang="es-CO" dirty="0" smtClean="0"/>
+              <a:rPr lang="es-CO" dirty="0"/>
               <a:t>False</a:t>
             </a:r>
             <a:endParaRPr lang="en-US" dirty="0"/>
@@ -3931,7 +3937,7 @@
           <a:p>
             <a:pPr algn="ctr"/>
             <a:r>
-              <a:rPr lang="es-CO" dirty="0" smtClean="0">
+              <a:rPr lang="es-CO" dirty="0">
                 <a:ln w="0"/>
                 <a:solidFill>
                   <a:schemeClr val="tx1"/>
@@ -4107,7 +4113,7 @@
           <a:p>
             <a:pPr algn="ctr"/>
             <a:r>
-              <a:rPr lang="es-CO" b="1" dirty="0" smtClean="0">
+              <a:rPr lang="es-CO" b="1" dirty="0">
                 <a:solidFill>
                   <a:schemeClr val="tx1"/>
                 </a:solidFill>
@@ -4165,7 +4171,7 @@
           <a:p>
             <a:pPr algn="ctr"/>
             <a:r>
-              <a:rPr lang="es-CO" b="1" dirty="0" smtClean="0">
+              <a:rPr lang="es-CO" b="1" dirty="0">
                 <a:solidFill>
                   <a:schemeClr val="tx1"/>
                 </a:solidFill>
@@ -4218,7 +4224,7 @@
           <a:p>
             <a:pPr algn="ctr"/>
             <a:r>
-              <a:rPr lang="es-CO" sz="1300" dirty="0" smtClean="0">
+              <a:rPr lang="es-CO" sz="1300" dirty="0">
                 <a:ln w="0"/>
                 <a:solidFill>
                   <a:schemeClr val="tx1"/>
@@ -4328,7 +4334,7 @@
           <a:p>
             <a:pPr algn="ctr"/>
             <a:r>
-              <a:rPr lang="es-CO" dirty="0" smtClean="0">
+              <a:rPr lang="es-CO" dirty="0">
                 <a:ln w="0"/>
                 <a:solidFill>
                   <a:schemeClr val="tx1"/>
@@ -4454,7 +4460,7 @@
           <a:lstStyle/>
           <a:p>
             <a:r>
-              <a:rPr lang="es-CO" dirty="0" smtClean="0"/>
+              <a:rPr lang="es-CO" dirty="0"/>
               <a:t>True</a:t>
             </a:r>
             <a:endParaRPr lang="en-US" dirty="0"/>
@@ -4484,7 +4490,7 @@
           <a:lstStyle/>
           <a:p>
             <a:r>
-              <a:rPr lang="es-CO" dirty="0" smtClean="0"/>
+              <a:rPr lang="es-CO" dirty="0"/>
               <a:t>False</a:t>
             </a:r>
             <a:endParaRPr lang="en-US" dirty="0"/>
@@ -4534,7 +4540,7 @@
           <a:p>
             <a:pPr algn="ctr"/>
             <a:r>
-              <a:rPr lang="es-CO" sz="1300" dirty="0" smtClean="0">
+              <a:rPr lang="es-CO" sz="1300" dirty="0">
                 <a:ln w="0"/>
                 <a:solidFill>
                   <a:schemeClr val="tx1"/>
@@ -4644,7 +4650,7 @@
           <a:p>
             <a:pPr algn="ctr"/>
             <a:r>
-              <a:rPr lang="es-CO" dirty="0" smtClean="0">
+              <a:rPr lang="es-CO" dirty="0">
                 <a:ln w="0"/>
                 <a:solidFill>
                   <a:schemeClr val="tx1"/>
@@ -4718,7 +4724,7 @@
           <a:p>
             <a:pPr algn="ctr"/>
             <a:r>
-              <a:rPr lang="es-CO" dirty="0" smtClean="0">
+              <a:rPr lang="es-CO" dirty="0">
                 <a:ln w="0"/>
                 <a:solidFill>
                   <a:schemeClr val="tx1"/>
@@ -4880,7 +4886,7 @@
           <a:lstStyle/>
           <a:p>
             <a:r>
-              <a:rPr lang="es-CO" dirty="0" smtClean="0"/>
+              <a:rPr lang="es-CO" dirty="0"/>
               <a:t>True</a:t>
             </a:r>
             <a:endParaRPr lang="en-US" dirty="0"/>
@@ -4910,7 +4916,7 @@
           <a:lstStyle/>
           <a:p>
             <a:r>
-              <a:rPr lang="es-CO" dirty="0" smtClean="0"/>
+              <a:rPr lang="es-CO" dirty="0"/>
               <a:t>False</a:t>
             </a:r>
             <a:endParaRPr lang="en-US" dirty="0"/>
@@ -4957,6 +4963,642 @@
     <p:extLst>
       <p:ext uri="{BB962C8B-B14F-4D97-AF65-F5344CB8AC3E}">
         <p14:creationId xmlns:p14="http://schemas.microsoft.com/office/powerpoint/2010/main" val="1333880843"/>
+      </p:ext>
+    </p:extLst>
+  </p:cSld>
+  <p:clrMapOvr>
+    <a:masterClrMapping/>
+  </p:clrMapOvr>
+</p:sld>
+</file>
+
+<file path=ppt/slides/slide4.xml><?xml version="1.0" encoding="utf-8"?>
+<p:sld xmlns:a="http://schemas.openxmlformats.org/drawingml/2006/main" xmlns:r="http://schemas.openxmlformats.org/officeDocument/2006/relationships" xmlns:p="http://schemas.openxmlformats.org/presentationml/2006/main">
+  <p:cSld>
+    <p:spTree>
+      <p:nvGrpSpPr>
+        <p:cNvPr id="1" name=""/>
+        <p:cNvGrpSpPr/>
+        <p:nvPr/>
+      </p:nvGrpSpPr>
+      <p:grpSpPr>
+        <a:xfrm>
+          <a:off x="0" y="0"/>
+          <a:ext cx="0" cy="0"/>
+          <a:chOff x="0" y="0"/>
+          <a:chExt cx="0" cy="0"/>
+        </a:xfrm>
+      </p:grpSpPr>
+      <p:grpSp>
+        <p:nvGrpSpPr>
+          <p:cNvPr id="57" name="Grupo 56">
+            <a:extLst>
+              <a:ext uri="{FF2B5EF4-FFF2-40B4-BE49-F238E27FC236}">
+                <a16:creationId xmlns:a16="http://schemas.microsoft.com/office/drawing/2014/main" id="{7CA9CAE0-A2D2-457D-AC8E-3343E4BAB1C6}"/>
+              </a:ext>
+            </a:extLst>
+          </p:cNvPr>
+          <p:cNvGrpSpPr/>
+          <p:nvPr/>
+        </p:nvGrpSpPr>
+        <p:grpSpPr>
+          <a:xfrm>
+            <a:off x="2725706" y="724987"/>
+            <a:ext cx="5607684" cy="5754189"/>
+            <a:chOff x="2725706" y="724987"/>
+            <a:chExt cx="5607684" cy="5754189"/>
+          </a:xfrm>
+        </p:grpSpPr>
+        <p:sp>
+          <p:nvSpPr>
+            <p:cNvPr id="4" name="Rectángulo redondeado 3"/>
+            <p:cNvSpPr/>
+            <p:nvPr/>
+          </p:nvSpPr>
+          <p:spPr>
+            <a:xfrm>
+              <a:off x="4885508" y="724987"/>
+              <a:ext cx="1872342" cy="740229"/>
+            </a:xfrm>
+            <a:prstGeom prst="roundRect">
+              <a:avLst/>
+            </a:prstGeom>
+            <a:solidFill>
+              <a:schemeClr val="accent1">
+                <a:lumMod val="20000"/>
+                <a:lumOff val="80000"/>
+              </a:schemeClr>
+            </a:solidFill>
+          </p:spPr>
+          <p:style>
+            <a:lnRef idx="2">
+              <a:schemeClr val="accent1">
+                <a:shade val="50000"/>
+              </a:schemeClr>
+            </a:lnRef>
+            <a:fillRef idx="1">
+              <a:schemeClr val="accent1"/>
+            </a:fillRef>
+            <a:effectRef idx="0">
+              <a:schemeClr val="accent1"/>
+            </a:effectRef>
+            <a:fontRef idx="minor">
+              <a:schemeClr val="lt1"/>
+            </a:fontRef>
+          </p:style>
+          <p:txBody>
+            <a:bodyPr rtlCol="0" anchor="ctr"/>
+            <a:lstStyle/>
+            <a:p>
+              <a:pPr algn="ctr"/>
+              <a:r>
+                <a:rPr lang="es-CO" b="1" dirty="0">
+                  <a:solidFill>
+                    <a:schemeClr val="tx1"/>
+                  </a:solidFill>
+                </a:rPr>
+                <a:t>Inicio</a:t>
+              </a:r>
+              <a:endParaRPr lang="en-US" b="1" dirty="0">
+                <a:solidFill>
+                  <a:schemeClr val="tx1"/>
+                </a:solidFill>
+              </a:endParaRPr>
+            </a:p>
+          </p:txBody>
+        </p:sp>
+        <p:sp>
+          <p:nvSpPr>
+            <p:cNvPr id="5" name="Rectángulo redondeado 4"/>
+            <p:cNvSpPr/>
+            <p:nvPr/>
+          </p:nvSpPr>
+          <p:spPr>
+            <a:xfrm>
+              <a:off x="4885508" y="5738947"/>
+              <a:ext cx="1872342" cy="740229"/>
+            </a:xfrm>
+            <a:prstGeom prst="roundRect">
+              <a:avLst/>
+            </a:prstGeom>
+            <a:solidFill>
+              <a:schemeClr val="accent1">
+                <a:lumMod val="20000"/>
+                <a:lumOff val="80000"/>
+              </a:schemeClr>
+            </a:solidFill>
+          </p:spPr>
+          <p:style>
+            <a:lnRef idx="2">
+              <a:schemeClr val="accent1">
+                <a:shade val="50000"/>
+              </a:schemeClr>
+            </a:lnRef>
+            <a:fillRef idx="1">
+              <a:schemeClr val="accent1"/>
+            </a:fillRef>
+            <a:effectRef idx="0">
+              <a:schemeClr val="accent1"/>
+            </a:effectRef>
+            <a:fontRef idx="minor">
+              <a:schemeClr val="lt1"/>
+            </a:fontRef>
+          </p:style>
+          <p:txBody>
+            <a:bodyPr rtlCol="0" anchor="ctr"/>
+            <a:lstStyle/>
+            <a:p>
+              <a:pPr algn="ctr"/>
+              <a:r>
+                <a:rPr lang="es-CO" b="1" dirty="0">
+                  <a:solidFill>
+                    <a:schemeClr val="tx1"/>
+                  </a:solidFill>
+                </a:rPr>
+                <a:t>Fin</a:t>
+              </a:r>
+            </a:p>
+          </p:txBody>
+        </p:sp>
+        <p:cxnSp>
+          <p:nvCxnSpPr>
+            <p:cNvPr id="7" name="Conector recto de flecha 6"/>
+            <p:cNvCxnSpPr>
+              <a:cxnSpLocks/>
+              <a:stCxn id="4" idx="2"/>
+              <a:endCxn id="2" idx="0"/>
+            </p:cNvCxnSpPr>
+            <p:nvPr/>
+          </p:nvCxnSpPr>
+          <p:spPr>
+            <a:xfrm flipH="1">
+              <a:off x="5821052" y="1465216"/>
+              <a:ext cx="627" cy="420145"/>
+            </a:xfrm>
+            <a:prstGeom prst="straightConnector1">
+              <a:avLst/>
+            </a:prstGeom>
+            <a:ln>
+              <a:tailEnd type="triangle"/>
+            </a:ln>
+          </p:spPr>
+          <p:style>
+            <a:lnRef idx="1">
+              <a:schemeClr val="dk1"/>
+            </a:lnRef>
+            <a:fillRef idx="0">
+              <a:schemeClr val="dk1"/>
+            </a:fillRef>
+            <a:effectRef idx="0">
+              <a:schemeClr val="dk1"/>
+            </a:effectRef>
+            <a:fontRef idx="minor">
+              <a:schemeClr val="tx1"/>
+            </a:fontRef>
+          </p:style>
+        </p:cxnSp>
+        <p:sp>
+          <p:nvSpPr>
+            <p:cNvPr id="8" name="Rectángulo 7"/>
+            <p:cNvSpPr/>
+            <p:nvPr/>
+          </p:nvSpPr>
+          <p:spPr>
+            <a:xfrm>
+              <a:off x="2725706" y="4854756"/>
+              <a:ext cx="1602378" cy="731519"/>
+            </a:xfrm>
+            <a:prstGeom prst="rect">
+              <a:avLst/>
+            </a:prstGeom>
+            <a:solidFill>
+              <a:schemeClr val="accent4">
+                <a:lumMod val="20000"/>
+                <a:lumOff val="80000"/>
+              </a:schemeClr>
+            </a:solidFill>
+          </p:spPr>
+          <p:style>
+            <a:lnRef idx="2">
+              <a:schemeClr val="accent1">
+                <a:shade val="50000"/>
+              </a:schemeClr>
+            </a:lnRef>
+            <a:fillRef idx="1">
+              <a:schemeClr val="accent1"/>
+            </a:fillRef>
+            <a:effectRef idx="0">
+              <a:schemeClr val="accent1"/>
+            </a:effectRef>
+            <a:fontRef idx="minor">
+              <a:schemeClr val="lt1"/>
+            </a:fontRef>
+          </p:style>
+          <p:txBody>
+            <a:bodyPr rtlCol="0" anchor="ctr"/>
+            <a:lstStyle/>
+            <a:p>
+              <a:pPr algn="ctr"/>
+              <a:r>
+                <a:rPr lang="es-CO" dirty="0">
+                  <a:ln w="0"/>
+                  <a:solidFill>
+                    <a:schemeClr val="tx1"/>
+                  </a:solidFill>
+                  <a:effectLst>
+                    <a:outerShdw blurRad="38100" dist="19050" dir="2700000" algn="tl" rotWithShape="0">
+                      <a:schemeClr val="dk1">
+                        <a:alpha val="40000"/>
+                      </a:schemeClr>
+                    </a:outerShdw>
+                  </a:effectLst>
+                </a:rPr>
+                <a:t>Bloque Código </a:t>
+              </a:r>
+              <a:endParaRPr lang="en-US" dirty="0">
+                <a:ln w="0"/>
+                <a:solidFill>
+                  <a:schemeClr val="tx1"/>
+                </a:solidFill>
+                <a:effectLst>
+                  <a:outerShdw blurRad="38100" dist="19050" dir="2700000" algn="tl" rotWithShape="0">
+                    <a:schemeClr val="dk1">
+                      <a:alpha val="40000"/>
+                    </a:schemeClr>
+                  </a:outerShdw>
+                </a:effectLst>
+              </a:endParaRPr>
+            </a:p>
+          </p:txBody>
+        </p:sp>
+        <p:sp>
+          <p:nvSpPr>
+            <p:cNvPr id="15" name="Rombo 14"/>
+            <p:cNvSpPr/>
+            <p:nvPr/>
+          </p:nvSpPr>
+          <p:spPr>
+            <a:xfrm>
+              <a:off x="3984597" y="3069047"/>
+              <a:ext cx="3672908" cy="1533717"/>
+            </a:xfrm>
+            <a:prstGeom prst="diamond">
+              <a:avLst/>
+            </a:prstGeom>
+            <a:solidFill>
+              <a:schemeClr val="accent4">
+                <a:lumMod val="40000"/>
+                <a:lumOff val="60000"/>
+              </a:schemeClr>
+            </a:solidFill>
+          </p:spPr>
+          <p:style>
+            <a:lnRef idx="2">
+              <a:schemeClr val="accent1">
+                <a:shade val="50000"/>
+              </a:schemeClr>
+            </a:lnRef>
+            <a:fillRef idx="1">
+              <a:schemeClr val="accent1"/>
+            </a:fillRef>
+            <a:effectRef idx="0">
+              <a:schemeClr val="accent1"/>
+            </a:effectRef>
+            <a:fontRef idx="minor">
+              <a:schemeClr val="lt1"/>
+            </a:fontRef>
+          </p:style>
+          <p:txBody>
+            <a:bodyPr rtlCol="0" anchor="ctr"/>
+            <a:lstStyle/>
+            <a:p>
+              <a:pPr algn="ctr"/>
+              <a:r>
+                <a:rPr lang="es-CO" dirty="0">
+                  <a:ln w="0"/>
+                  <a:solidFill>
+                    <a:schemeClr val="tx1"/>
+                  </a:solidFill>
+                  <a:effectLst>
+                    <a:outerShdw blurRad="38100" dist="19050" dir="2700000" algn="tl" rotWithShape="0">
+                      <a:schemeClr val="dk1">
+                        <a:alpha val="40000"/>
+                      </a:schemeClr>
+                    </a:outerShdw>
+                  </a:effectLst>
+                </a:rPr>
+                <a:t>Ya se recorrió toda la estructura iterable definida?</a:t>
+              </a:r>
+              <a:endParaRPr lang="en-US" dirty="0">
+                <a:ln w="0"/>
+                <a:solidFill>
+                  <a:schemeClr val="tx1"/>
+                </a:solidFill>
+                <a:effectLst>
+                  <a:outerShdw blurRad="38100" dist="19050" dir="2700000" algn="tl" rotWithShape="0">
+                    <a:schemeClr val="dk1">
+                      <a:alpha val="40000"/>
+                    </a:schemeClr>
+                  </a:outerShdw>
+                </a:effectLst>
+              </a:endParaRPr>
+            </a:p>
+          </p:txBody>
+        </p:sp>
+        <p:cxnSp>
+          <p:nvCxnSpPr>
+            <p:cNvPr id="26" name="Conector angular 25"/>
+            <p:cNvCxnSpPr>
+              <a:cxnSpLocks/>
+              <a:stCxn id="15" idx="3"/>
+              <a:endCxn id="5" idx="3"/>
+            </p:cNvCxnSpPr>
+            <p:nvPr/>
+          </p:nvCxnSpPr>
+          <p:spPr>
+            <a:xfrm flipH="1">
+              <a:off x="6757850" y="3835906"/>
+              <a:ext cx="899655" cy="2273156"/>
+            </a:xfrm>
+            <a:prstGeom prst="bentConnector3">
+              <a:avLst>
+                <a:gd name="adj1" fmla="val -64179"/>
+              </a:avLst>
+            </a:prstGeom>
+            <a:ln>
+              <a:tailEnd type="triangle"/>
+            </a:ln>
+          </p:spPr>
+          <p:style>
+            <a:lnRef idx="1">
+              <a:schemeClr val="dk1"/>
+            </a:lnRef>
+            <a:fillRef idx="0">
+              <a:schemeClr val="dk1"/>
+            </a:fillRef>
+            <a:effectRef idx="0">
+              <a:schemeClr val="dk1"/>
+            </a:effectRef>
+            <a:fontRef idx="minor">
+              <a:schemeClr val="tx1"/>
+            </a:fontRef>
+          </p:style>
+        </p:cxnSp>
+        <p:sp>
+          <p:nvSpPr>
+            <p:cNvPr id="48" name="CuadroTexto 47"/>
+            <p:cNvSpPr txBox="1"/>
+            <p:nvPr/>
+          </p:nvSpPr>
+          <p:spPr>
+            <a:xfrm>
+              <a:off x="7567036" y="3326151"/>
+              <a:ext cx="766354" cy="369332"/>
+            </a:xfrm>
+            <a:prstGeom prst="rect">
+              <a:avLst/>
+            </a:prstGeom>
+            <a:noFill/>
+          </p:spPr>
+          <p:txBody>
+            <a:bodyPr wrap="square" rtlCol="0">
+              <a:spAutoFit/>
+            </a:bodyPr>
+            <a:lstStyle/>
+            <a:p>
+              <a:r>
+                <a:rPr lang="es-CO" dirty="0"/>
+                <a:t>True</a:t>
+              </a:r>
+              <a:endParaRPr lang="en-US" dirty="0"/>
+            </a:p>
+          </p:txBody>
+        </p:sp>
+        <p:sp>
+          <p:nvSpPr>
+            <p:cNvPr id="49" name="CuadroTexto 48"/>
+            <p:cNvSpPr txBox="1"/>
+            <p:nvPr/>
+          </p:nvSpPr>
+          <p:spPr>
+            <a:xfrm>
+              <a:off x="3395300" y="3326151"/>
+              <a:ext cx="766354" cy="369332"/>
+            </a:xfrm>
+            <a:prstGeom prst="rect">
+              <a:avLst/>
+            </a:prstGeom>
+            <a:noFill/>
+          </p:spPr>
+          <p:txBody>
+            <a:bodyPr wrap="square" rtlCol="0">
+              <a:spAutoFit/>
+            </a:bodyPr>
+            <a:lstStyle/>
+            <a:p>
+              <a:r>
+                <a:rPr lang="es-CO" dirty="0"/>
+                <a:t>False</a:t>
+              </a:r>
+              <a:endParaRPr lang="en-US" dirty="0"/>
+            </a:p>
+          </p:txBody>
+        </p:sp>
+        <p:sp>
+          <p:nvSpPr>
+            <p:cNvPr id="2" name="Rectángulo 1">
+              <a:extLst>
+                <a:ext uri="{FF2B5EF4-FFF2-40B4-BE49-F238E27FC236}">
+                  <a16:creationId xmlns:a16="http://schemas.microsoft.com/office/drawing/2014/main" id="{56AC4BA7-FF02-4596-A87E-A6DAD6EF2CBA}"/>
+                </a:ext>
+              </a:extLst>
+            </p:cNvPr>
+            <p:cNvSpPr/>
+            <p:nvPr/>
+          </p:nvSpPr>
+          <p:spPr>
+            <a:xfrm>
+              <a:off x="4656841" y="1885361"/>
+              <a:ext cx="2328421" cy="823393"/>
+            </a:xfrm>
+            <a:prstGeom prst="rect">
+              <a:avLst/>
+            </a:prstGeom>
+            <a:solidFill>
+              <a:srgbClr val="B7FBDB"/>
+            </a:solidFill>
+            <a:ln>
+              <a:solidFill>
+                <a:srgbClr val="00B050"/>
+              </a:solidFill>
+            </a:ln>
+          </p:spPr>
+          <p:style>
+            <a:lnRef idx="2">
+              <a:schemeClr val="accent1">
+                <a:shade val="50000"/>
+              </a:schemeClr>
+            </a:lnRef>
+            <a:fillRef idx="1">
+              <a:schemeClr val="accent1"/>
+            </a:fillRef>
+            <a:effectRef idx="0">
+              <a:schemeClr val="accent1"/>
+            </a:effectRef>
+            <a:fontRef idx="minor">
+              <a:schemeClr val="lt1"/>
+            </a:fontRef>
+          </p:style>
+          <p:txBody>
+            <a:bodyPr rtlCol="0" anchor="ctr"/>
+            <a:lstStyle/>
+            <a:p>
+              <a:pPr algn="ctr"/>
+              <a:r>
+                <a:rPr lang="es-CO" dirty="0">
+                  <a:solidFill>
+                    <a:schemeClr val="tx1"/>
+                  </a:solidFill>
+                </a:rPr>
+                <a:t>Definir un iterador y la estructura iterable a recorrer</a:t>
+              </a:r>
+            </a:p>
+          </p:txBody>
+        </p:sp>
+        <p:cxnSp>
+          <p:nvCxnSpPr>
+            <p:cNvPr id="46" name="Conector recto de flecha 45">
+              <a:extLst>
+                <a:ext uri="{FF2B5EF4-FFF2-40B4-BE49-F238E27FC236}">
+                  <a16:creationId xmlns:a16="http://schemas.microsoft.com/office/drawing/2014/main" id="{C63CF7A1-79B0-4DA5-8858-D82CED889C6A}"/>
+                </a:ext>
+              </a:extLst>
+            </p:cNvPr>
+            <p:cNvCxnSpPr>
+              <a:cxnSpLocks/>
+              <a:stCxn id="2" idx="2"/>
+              <a:endCxn id="15" idx="0"/>
+            </p:cNvCxnSpPr>
+            <p:nvPr/>
+          </p:nvCxnSpPr>
+          <p:spPr>
+            <a:xfrm flipH="1">
+              <a:off x="5821051" y="2708754"/>
+              <a:ext cx="1" cy="360293"/>
+            </a:xfrm>
+            <a:prstGeom prst="straightConnector1">
+              <a:avLst/>
+            </a:prstGeom>
+            <a:ln>
+              <a:tailEnd type="triangle"/>
+            </a:ln>
+          </p:spPr>
+          <p:style>
+            <a:lnRef idx="1">
+              <a:schemeClr val="dk1"/>
+            </a:lnRef>
+            <a:fillRef idx="0">
+              <a:schemeClr val="dk1"/>
+            </a:fillRef>
+            <a:effectRef idx="0">
+              <a:schemeClr val="dk1"/>
+            </a:effectRef>
+            <a:fontRef idx="minor">
+              <a:schemeClr val="tx1"/>
+            </a:fontRef>
+          </p:style>
+        </p:cxnSp>
+        <p:cxnSp>
+          <p:nvCxnSpPr>
+            <p:cNvPr id="50" name="Conector angular 25">
+              <a:extLst>
+                <a:ext uri="{FF2B5EF4-FFF2-40B4-BE49-F238E27FC236}">
+                  <a16:creationId xmlns:a16="http://schemas.microsoft.com/office/drawing/2014/main" id="{2ADAA4E8-C1F3-4257-8F49-ED37E5FA62B8}"/>
+                </a:ext>
+              </a:extLst>
+            </p:cNvPr>
+            <p:cNvCxnSpPr>
+              <a:cxnSpLocks/>
+              <a:stCxn id="15" idx="1"/>
+              <a:endCxn id="8" idx="0"/>
+            </p:cNvCxnSpPr>
+            <p:nvPr/>
+          </p:nvCxnSpPr>
+          <p:spPr>
+            <a:xfrm rot="10800000" flipV="1">
+              <a:off x="3526895" y="3835906"/>
+              <a:ext cx="457702" cy="1018850"/>
+            </a:xfrm>
+            <a:prstGeom prst="bentConnector2">
+              <a:avLst/>
+            </a:prstGeom>
+            <a:ln>
+              <a:tailEnd type="triangle"/>
+            </a:ln>
+          </p:spPr>
+          <p:style>
+            <a:lnRef idx="1">
+              <a:schemeClr val="dk1"/>
+            </a:lnRef>
+            <a:fillRef idx="0">
+              <a:schemeClr val="dk1"/>
+            </a:fillRef>
+            <a:effectRef idx="0">
+              <a:schemeClr val="dk1"/>
+            </a:effectRef>
+            <a:fontRef idx="minor">
+              <a:schemeClr val="tx1"/>
+            </a:fontRef>
+          </p:style>
+        </p:cxnSp>
+        <p:cxnSp>
+          <p:nvCxnSpPr>
+            <p:cNvPr id="54" name="Conector angular 10">
+              <a:extLst>
+                <a:ext uri="{FF2B5EF4-FFF2-40B4-BE49-F238E27FC236}">
+                  <a16:creationId xmlns:a16="http://schemas.microsoft.com/office/drawing/2014/main" id="{B44ECF1A-14B7-4585-A20A-0319E2B0E455}"/>
+                </a:ext>
+              </a:extLst>
+            </p:cNvPr>
+            <p:cNvCxnSpPr>
+              <a:cxnSpLocks/>
+              <a:stCxn id="8" idx="3"/>
+              <a:endCxn id="15" idx="2"/>
+            </p:cNvCxnSpPr>
+            <p:nvPr/>
+          </p:nvCxnSpPr>
+          <p:spPr>
+            <a:xfrm flipV="1">
+              <a:off x="4328084" y="4602764"/>
+              <a:ext cx="1492967" cy="617752"/>
+            </a:xfrm>
+            <a:prstGeom prst="bentConnector2">
+              <a:avLst/>
+            </a:prstGeom>
+            <a:ln>
+              <a:tailEnd type="triangle"/>
+            </a:ln>
+          </p:spPr>
+          <p:style>
+            <a:lnRef idx="1">
+              <a:schemeClr val="dk1"/>
+            </a:lnRef>
+            <a:fillRef idx="0">
+              <a:schemeClr val="dk1"/>
+            </a:fillRef>
+            <a:effectRef idx="0">
+              <a:schemeClr val="dk1"/>
+            </a:effectRef>
+            <a:fontRef idx="minor">
+              <a:schemeClr val="tx1"/>
+            </a:fontRef>
+          </p:style>
+        </p:cxnSp>
+      </p:grpSp>
+    </p:spTree>
+    <p:extLst>
+      <p:ext uri="{BB962C8B-B14F-4D97-AF65-F5344CB8AC3E}">
+        <p14:creationId xmlns:p14="http://schemas.microsoft.com/office/powerpoint/2010/main" val="2045484933"/>
       </p:ext>
     </p:extLst>
   </p:cSld>

</xml_diff>